<commit_message>
Feat Presentation 07 and readme
</commit_message>
<xml_diff>
--- a/Presentations/Presentation07.pptx
+++ b/Presentations/Presentation07.pptx
@@ -5,17 +5,18 @@
     <p:sldMasterId id="2147483657" r:id="rId4"/>
   </p:sldMasterIdLst>
   <p:notesMasterIdLst>
-    <p:notesMasterId r:id="rId10"/>
+    <p:notesMasterId r:id="rId11"/>
   </p:notesMasterIdLst>
   <p:handoutMasterIdLst>
-    <p:handoutMasterId r:id="rId11"/>
+    <p:handoutMasterId r:id="rId12"/>
   </p:handoutMasterIdLst>
   <p:sldIdLst>
     <p:sldId id="256" r:id="rId5"/>
     <p:sldId id="275" r:id="rId6"/>
     <p:sldId id="297" r:id="rId7"/>
-    <p:sldId id="296" r:id="rId8"/>
-    <p:sldId id="298" r:id="rId9"/>
+    <p:sldId id="298" r:id="rId8"/>
+    <p:sldId id="296" r:id="rId9"/>
+    <p:sldId id="299" r:id="rId10"/>
   </p:sldIdLst>
   <p:sldSz cx="12192000" cy="6858000"/>
   <p:notesSz cx="6858000" cy="9144000"/>
@@ -7451,206 +7452,6 @@
         <p:cNvPr id="1" name="">
           <a:extLst>
             <a:ext uri="{FF2B5EF4-FFF2-40B4-BE49-F238E27FC236}">
-              <a16:creationId xmlns:a16="http://schemas.microsoft.com/office/drawing/2014/main" id="{5FAC9D1E-92B2-E711-1380-5B674FC78702}"/>
-            </a:ext>
-          </a:extLst>
-        </p:cNvPr>
-        <p:cNvGrpSpPr/>
-        <p:nvPr/>
-      </p:nvGrpSpPr>
-      <p:grpSpPr>
-        <a:xfrm>
-          <a:off x="0" y="0"/>
-          <a:ext cx="0" cy="0"/>
-          <a:chOff x="0" y="0"/>
-          <a:chExt cx="0" cy="0"/>
-        </a:xfrm>
-      </p:grpSpPr>
-      <p:sp>
-        <p:nvSpPr>
-          <p:cNvPr id="2" name="Zástupný symbol pro zápatí 1">
-            <a:extLst>
-              <a:ext uri="{FF2B5EF4-FFF2-40B4-BE49-F238E27FC236}">
-                <a16:creationId xmlns:a16="http://schemas.microsoft.com/office/drawing/2014/main" id="{7779CA46-5249-6E0D-8DC4-4837211D61C3}"/>
-              </a:ext>
-            </a:extLst>
-          </p:cNvPr>
-          <p:cNvSpPr>
-            <a:spLocks noGrp="1"/>
-          </p:cNvSpPr>
-          <p:nvPr>
-            <p:ph type="ftr" sz="quarter" idx="10"/>
-          </p:nvPr>
-        </p:nvSpPr>
-        <p:spPr/>
-        <p:txBody>
-          <a:bodyPr/>
-          <a:lstStyle/>
-          <a:p>
-            <a:r>
-              <a:rPr lang="cs-CZ" noProof="0" dirty="0"/>
-              <a:t>PV293 - Softwarové architektury</a:t>
-            </a:r>
-          </a:p>
-        </p:txBody>
-      </p:sp>
-      <p:sp>
-        <p:nvSpPr>
-          <p:cNvPr id="3" name="Zástupný symbol pro číslo snímku 2">
-            <a:extLst>
-              <a:ext uri="{FF2B5EF4-FFF2-40B4-BE49-F238E27FC236}">
-                <a16:creationId xmlns:a16="http://schemas.microsoft.com/office/drawing/2014/main" id="{98FF0F4A-6F64-E3F6-6914-5459CC067BD5}"/>
-              </a:ext>
-            </a:extLst>
-          </p:cNvPr>
-          <p:cNvSpPr>
-            <a:spLocks noGrp="1"/>
-          </p:cNvSpPr>
-          <p:nvPr>
-            <p:ph type="sldNum" sz="quarter" idx="11"/>
-          </p:nvPr>
-        </p:nvSpPr>
-        <p:spPr/>
-        <p:txBody>
-          <a:bodyPr/>
-          <a:lstStyle/>
-          <a:p>
-            <a:fld id="{0970407D-EE58-4A0B-824B-1D3AE42DD9CF}" type="slidenum">
-              <a:rPr lang="cs-CZ" noProof="0" smtClean="0"/>
-              <a:pPr/>
-              <a:t>4</a:t>
-            </a:fld>
-            <a:endParaRPr lang="cs-CZ" noProof="0" dirty="0"/>
-          </a:p>
-        </p:txBody>
-      </p:sp>
-      <p:sp>
-        <p:nvSpPr>
-          <p:cNvPr id="4" name="Nadpis 3">
-            <a:extLst>
-              <a:ext uri="{FF2B5EF4-FFF2-40B4-BE49-F238E27FC236}">
-                <a16:creationId xmlns:a16="http://schemas.microsoft.com/office/drawing/2014/main" id="{722DDD38-285F-801E-DFD1-92FADF4C81A4}"/>
-              </a:ext>
-            </a:extLst>
-          </p:cNvPr>
-          <p:cNvSpPr>
-            <a:spLocks noGrp="1"/>
-          </p:cNvSpPr>
-          <p:nvPr>
-            <p:ph type="title"/>
-          </p:nvPr>
-        </p:nvSpPr>
-        <p:spPr/>
-        <p:txBody>
-          <a:bodyPr/>
-          <a:lstStyle/>
-          <a:p>
-            <a:r>
-              <a:rPr lang="cs-CZ" noProof="0" dirty="0" err="1"/>
-              <a:t>Vercital</a:t>
-            </a:r>
-            <a:r>
-              <a:rPr lang="cs-CZ" noProof="0" dirty="0"/>
-              <a:t> </a:t>
-            </a:r>
-            <a:r>
-              <a:rPr lang="cs-CZ" noProof="0" dirty="0" err="1"/>
-              <a:t>slice</a:t>
-            </a:r>
-            <a:r>
-              <a:rPr lang="cs-CZ" noProof="0" dirty="0"/>
-              <a:t> </a:t>
-            </a:r>
-            <a:r>
-              <a:rPr lang="cs-CZ" noProof="0" dirty="0" err="1"/>
-              <a:t>architecture</a:t>
-            </a:r>
-            <a:endParaRPr lang="cs-CZ" noProof="0" dirty="0"/>
-          </a:p>
-        </p:txBody>
-      </p:sp>
-      <p:sp>
-        <p:nvSpPr>
-          <p:cNvPr id="6" name="Zástupný obsah 5">
-            <a:extLst>
-              <a:ext uri="{FF2B5EF4-FFF2-40B4-BE49-F238E27FC236}">
-                <a16:creationId xmlns:a16="http://schemas.microsoft.com/office/drawing/2014/main" id="{0B8E76BC-2BB7-0B4A-29C1-6153C2679840}"/>
-              </a:ext>
-            </a:extLst>
-          </p:cNvPr>
-          <p:cNvSpPr>
-            <a:spLocks noGrp="1"/>
-          </p:cNvSpPr>
-          <p:nvPr>
-            <p:ph idx="1"/>
-          </p:nvPr>
-        </p:nvSpPr>
-        <p:spPr/>
-        <p:txBody>
-          <a:bodyPr/>
-          <a:lstStyle/>
-          <a:p>
-            <a:r>
-              <a:rPr lang="cs-CZ" i="1" dirty="0"/>
-              <a:t>Je možné spojit </a:t>
-            </a:r>
-            <a:r>
-              <a:rPr lang="cs-CZ" i="1" dirty="0" err="1"/>
-              <a:t>Vertical</a:t>
-            </a:r>
-            <a:r>
-              <a:rPr lang="cs-CZ" i="1" dirty="0"/>
-              <a:t> </a:t>
-            </a:r>
-            <a:r>
-              <a:rPr lang="cs-CZ" i="1" dirty="0" err="1"/>
-              <a:t>slice</a:t>
-            </a:r>
-            <a:r>
-              <a:rPr lang="cs-CZ" i="1" dirty="0"/>
-              <a:t> s </a:t>
-            </a:r>
-            <a:r>
-              <a:rPr lang="cs-CZ" i="1" dirty="0" err="1"/>
-              <a:t>Clean</a:t>
-            </a:r>
-            <a:r>
-              <a:rPr lang="cs-CZ" i="1" dirty="0"/>
-              <a:t> </a:t>
-            </a:r>
-            <a:r>
-              <a:rPr lang="cs-CZ" i="1" dirty="0" err="1"/>
-              <a:t>architecture</a:t>
-            </a:r>
-            <a:r>
-              <a:rPr lang="cs-CZ" i="1" dirty="0"/>
-              <a:t>?</a:t>
-            </a:r>
-            <a:endParaRPr lang="en-US" i="1" dirty="0"/>
-          </a:p>
-        </p:txBody>
-      </p:sp>
-    </p:spTree>
-    <p:extLst>
-      <p:ext uri="{BB962C8B-B14F-4D97-AF65-F5344CB8AC3E}">
-        <p14:creationId xmlns:p14="http://schemas.microsoft.com/office/powerpoint/2010/main" val="1506238190"/>
-      </p:ext>
-    </p:extLst>
-  </p:cSld>
-  <p:clrMapOvr>
-    <a:masterClrMapping/>
-  </p:clrMapOvr>
-</p:sld>
-</file>
-
-<file path=ppt/slides/slide5.xml><?xml version="1.0" encoding="utf-8"?>
-<p:sld xmlns:a="http://schemas.openxmlformats.org/drawingml/2006/main" xmlns:r="http://schemas.openxmlformats.org/officeDocument/2006/relationships" xmlns:p="http://schemas.openxmlformats.org/presentationml/2006/main">
-  <p:cSld>
-    <p:spTree>
-      <p:nvGrpSpPr>
-        <p:cNvPr id="1" name="">
-          <a:extLst>
-            <a:ext uri="{FF2B5EF4-FFF2-40B4-BE49-F238E27FC236}">
               <a16:creationId xmlns:a16="http://schemas.microsoft.com/office/drawing/2014/main" id="{C265FA5E-17D2-2E0D-621D-96B8068E2174}"/>
             </a:ext>
           </a:extLst>
@@ -7718,7 +7519,7 @@
             <a:fld id="{0970407D-EE58-4A0B-824B-1D3AE42DD9CF}" type="slidenum">
               <a:rPr lang="cs-CZ" noProof="0" smtClean="0"/>
               <a:pPr/>
-              <a:t>5</a:t>
+              <a:t>4</a:t>
             </a:fld>
             <a:endParaRPr lang="cs-CZ" noProof="0" dirty="0"/>
           </a:p>
@@ -7838,6 +7639,1092 @@
   <p:clrMapOvr>
     <a:masterClrMapping/>
   </p:clrMapOvr>
+</p:sld>
+</file>
+
+<file path=ppt/slides/slide5.xml><?xml version="1.0" encoding="utf-8"?>
+<p:sld xmlns:a="http://schemas.openxmlformats.org/drawingml/2006/main" xmlns:r="http://schemas.openxmlformats.org/officeDocument/2006/relationships" xmlns:p="http://schemas.openxmlformats.org/presentationml/2006/main">
+  <p:cSld>
+    <p:spTree>
+      <p:nvGrpSpPr>
+        <p:cNvPr id="1" name="">
+          <a:extLst>
+            <a:ext uri="{FF2B5EF4-FFF2-40B4-BE49-F238E27FC236}">
+              <a16:creationId xmlns:a16="http://schemas.microsoft.com/office/drawing/2014/main" id="{5FAC9D1E-92B2-E711-1380-5B674FC78702}"/>
+            </a:ext>
+          </a:extLst>
+        </p:cNvPr>
+        <p:cNvGrpSpPr/>
+        <p:nvPr/>
+      </p:nvGrpSpPr>
+      <p:grpSpPr>
+        <a:xfrm>
+          <a:off x="0" y="0"/>
+          <a:ext cx="0" cy="0"/>
+          <a:chOff x="0" y="0"/>
+          <a:chExt cx="0" cy="0"/>
+        </a:xfrm>
+      </p:grpSpPr>
+      <p:sp>
+        <p:nvSpPr>
+          <p:cNvPr id="2" name="Zástupný symbol pro zápatí 1">
+            <a:extLst>
+              <a:ext uri="{FF2B5EF4-FFF2-40B4-BE49-F238E27FC236}">
+                <a16:creationId xmlns:a16="http://schemas.microsoft.com/office/drawing/2014/main" id="{7779CA46-5249-6E0D-8DC4-4837211D61C3}"/>
+              </a:ext>
+            </a:extLst>
+          </p:cNvPr>
+          <p:cNvSpPr>
+            <a:spLocks noGrp="1"/>
+          </p:cNvSpPr>
+          <p:nvPr>
+            <p:ph type="ftr" sz="quarter" idx="10"/>
+          </p:nvPr>
+        </p:nvSpPr>
+        <p:spPr/>
+        <p:txBody>
+          <a:bodyPr/>
+          <a:lstStyle/>
+          <a:p>
+            <a:r>
+              <a:rPr lang="cs-CZ" noProof="0" dirty="0"/>
+              <a:t>PV293 - Softwarové architektury</a:t>
+            </a:r>
+          </a:p>
+        </p:txBody>
+      </p:sp>
+      <p:sp>
+        <p:nvSpPr>
+          <p:cNvPr id="3" name="Zástupný symbol pro číslo snímku 2">
+            <a:extLst>
+              <a:ext uri="{FF2B5EF4-FFF2-40B4-BE49-F238E27FC236}">
+                <a16:creationId xmlns:a16="http://schemas.microsoft.com/office/drawing/2014/main" id="{98FF0F4A-6F64-E3F6-6914-5459CC067BD5}"/>
+              </a:ext>
+            </a:extLst>
+          </p:cNvPr>
+          <p:cNvSpPr>
+            <a:spLocks noGrp="1"/>
+          </p:cNvSpPr>
+          <p:nvPr>
+            <p:ph type="sldNum" sz="quarter" idx="11"/>
+          </p:nvPr>
+        </p:nvSpPr>
+        <p:spPr/>
+        <p:txBody>
+          <a:bodyPr/>
+          <a:lstStyle/>
+          <a:p>
+            <a:fld id="{0970407D-EE58-4A0B-824B-1D3AE42DD9CF}" type="slidenum">
+              <a:rPr lang="cs-CZ" noProof="0" smtClean="0"/>
+              <a:pPr/>
+              <a:t>5</a:t>
+            </a:fld>
+            <a:endParaRPr lang="cs-CZ" noProof="0" dirty="0"/>
+          </a:p>
+        </p:txBody>
+      </p:sp>
+      <p:sp>
+        <p:nvSpPr>
+          <p:cNvPr id="4" name="Nadpis 3">
+            <a:extLst>
+              <a:ext uri="{FF2B5EF4-FFF2-40B4-BE49-F238E27FC236}">
+                <a16:creationId xmlns:a16="http://schemas.microsoft.com/office/drawing/2014/main" id="{722DDD38-285F-801E-DFD1-92FADF4C81A4}"/>
+              </a:ext>
+            </a:extLst>
+          </p:cNvPr>
+          <p:cNvSpPr>
+            <a:spLocks noGrp="1"/>
+          </p:cNvSpPr>
+          <p:nvPr>
+            <p:ph type="title"/>
+          </p:nvPr>
+        </p:nvSpPr>
+        <p:spPr/>
+        <p:txBody>
+          <a:bodyPr/>
+          <a:lstStyle/>
+          <a:p>
+            <a:r>
+              <a:rPr lang="cs-CZ" noProof="0" dirty="0" err="1"/>
+              <a:t>Vercital</a:t>
+            </a:r>
+            <a:r>
+              <a:rPr lang="cs-CZ" noProof="0" dirty="0"/>
+              <a:t> </a:t>
+            </a:r>
+            <a:r>
+              <a:rPr lang="cs-CZ" noProof="0" dirty="0" err="1"/>
+              <a:t>slice</a:t>
+            </a:r>
+            <a:r>
+              <a:rPr lang="cs-CZ" noProof="0" dirty="0"/>
+              <a:t> </a:t>
+            </a:r>
+            <a:r>
+              <a:rPr lang="cs-CZ" noProof="0" dirty="0" err="1"/>
+              <a:t>architecture</a:t>
+            </a:r>
+            <a:endParaRPr lang="cs-CZ" noProof="0" dirty="0"/>
+          </a:p>
+        </p:txBody>
+      </p:sp>
+      <p:sp>
+        <p:nvSpPr>
+          <p:cNvPr id="6" name="Zástupný obsah 5">
+            <a:extLst>
+              <a:ext uri="{FF2B5EF4-FFF2-40B4-BE49-F238E27FC236}">
+                <a16:creationId xmlns:a16="http://schemas.microsoft.com/office/drawing/2014/main" id="{0B8E76BC-2BB7-0B4A-29C1-6153C2679840}"/>
+              </a:ext>
+            </a:extLst>
+          </p:cNvPr>
+          <p:cNvSpPr>
+            <a:spLocks noGrp="1"/>
+          </p:cNvSpPr>
+          <p:nvPr>
+            <p:ph idx="1"/>
+          </p:nvPr>
+        </p:nvSpPr>
+        <p:spPr/>
+        <p:txBody>
+          <a:bodyPr/>
+          <a:lstStyle/>
+          <a:p>
+            <a:r>
+              <a:rPr lang="cs-CZ" i="1" dirty="0"/>
+              <a:t>Je možné spojit </a:t>
+            </a:r>
+            <a:r>
+              <a:rPr lang="cs-CZ" i="1" dirty="0" err="1"/>
+              <a:t>Vertical</a:t>
+            </a:r>
+            <a:r>
+              <a:rPr lang="cs-CZ" i="1" dirty="0"/>
+              <a:t> </a:t>
+            </a:r>
+            <a:r>
+              <a:rPr lang="cs-CZ" i="1" dirty="0" err="1"/>
+              <a:t>slice</a:t>
+            </a:r>
+            <a:r>
+              <a:rPr lang="cs-CZ" i="1" dirty="0"/>
+              <a:t> s </a:t>
+            </a:r>
+            <a:r>
+              <a:rPr lang="cs-CZ" i="1" dirty="0" err="1"/>
+              <a:t>Clean</a:t>
+            </a:r>
+            <a:r>
+              <a:rPr lang="cs-CZ" i="1" dirty="0"/>
+              <a:t> </a:t>
+            </a:r>
+            <a:r>
+              <a:rPr lang="cs-CZ" i="1" dirty="0" err="1"/>
+              <a:t>architecture</a:t>
+            </a:r>
+            <a:r>
+              <a:rPr lang="cs-CZ" i="1" dirty="0"/>
+              <a:t>?</a:t>
+            </a:r>
+          </a:p>
+          <a:p>
+            <a:pPr lvl="1"/>
+            <a:r>
+              <a:rPr lang="cs-CZ" dirty="0"/>
+              <a:t>Nic nebrání v kombinaci – hlavní dělení s pomocí </a:t>
+            </a:r>
+            <a:r>
+              <a:rPr lang="cs-CZ" dirty="0" err="1"/>
+              <a:t>Vercial</a:t>
+            </a:r>
+            <a:r>
+              <a:rPr lang="cs-CZ" dirty="0"/>
+              <a:t> </a:t>
+            </a:r>
+            <a:r>
+              <a:rPr lang="cs-CZ" dirty="0" err="1"/>
+              <a:t>slice</a:t>
+            </a:r>
+            <a:r>
+              <a:rPr lang="cs-CZ" dirty="0"/>
+              <a:t> (jednotlivé části budou svůj vlastní „modul“, kde bude existovat modul pro Produkty, Košík, </a:t>
+            </a:r>
+            <a:r>
+              <a:rPr lang="cs-CZ" dirty="0" err="1"/>
+              <a:t>Order</a:t>
+            </a:r>
+            <a:r>
+              <a:rPr lang="cs-CZ" dirty="0"/>
+              <a:t>…) a pro tyto jednotlivé části budeme vnitřně aplikovat dělení jako nás učí </a:t>
+            </a:r>
+            <a:r>
+              <a:rPr lang="cs-CZ" dirty="0" err="1"/>
+              <a:t>Clean</a:t>
+            </a:r>
+            <a:r>
+              <a:rPr lang="cs-CZ" dirty="0"/>
+              <a:t> </a:t>
+            </a:r>
+            <a:r>
+              <a:rPr lang="cs-CZ" dirty="0" err="1"/>
+              <a:t>architecture</a:t>
+            </a:r>
+            <a:endParaRPr lang="cs-CZ" dirty="0"/>
+          </a:p>
+        </p:txBody>
+      </p:sp>
+    </p:spTree>
+    <p:extLst>
+      <p:ext uri="{BB962C8B-B14F-4D97-AF65-F5344CB8AC3E}">
+        <p14:creationId xmlns:p14="http://schemas.microsoft.com/office/powerpoint/2010/main" val="1506238190"/>
+      </p:ext>
+    </p:extLst>
+  </p:cSld>
+  <p:clrMapOvr>
+    <a:masterClrMapping/>
+  </p:clrMapOvr>
+  <p:timing>
+    <p:tnLst>
+      <p:par>
+        <p:cTn id="1" dur="indefinite" restart="never" nodeType="tmRoot">
+          <p:childTnLst>
+            <p:seq concurrent="1" nextAc="seek">
+              <p:cTn id="2" dur="indefinite" nodeType="mainSeq">
+                <p:childTnLst>
+                  <p:par>
+                    <p:cTn id="3" fill="hold">
+                      <p:stCondLst>
+                        <p:cond delay="indefinite"/>
+                      </p:stCondLst>
+                      <p:childTnLst>
+                        <p:par>
+                          <p:cTn id="4" fill="hold">
+                            <p:stCondLst>
+                              <p:cond delay="0"/>
+                            </p:stCondLst>
+                            <p:childTnLst>
+                              <p:par>
+                                <p:cTn id="5" presetID="10" presetClass="entr" presetSubtype="0" fill="hold" nodeType="clickEffect">
+                                  <p:stCondLst>
+                                    <p:cond delay="0"/>
+                                  </p:stCondLst>
+                                  <p:childTnLst>
+                                    <p:set>
+                                      <p:cBhvr>
+                                        <p:cTn id="6" dur="1" fill="hold">
+                                          <p:stCondLst>
+                                            <p:cond delay="0"/>
+                                          </p:stCondLst>
+                                        </p:cTn>
+                                        <p:tgtEl>
+                                          <p:spTgt spid="6">
+                                            <p:txEl>
+                                              <p:pRg st="1" end="1"/>
+                                            </p:txEl>
+                                          </p:spTgt>
+                                        </p:tgtEl>
+                                        <p:attrNameLst>
+                                          <p:attrName>style.visibility</p:attrName>
+                                        </p:attrNameLst>
+                                      </p:cBhvr>
+                                      <p:to>
+                                        <p:strVal val="visible"/>
+                                      </p:to>
+                                    </p:set>
+                                    <p:animEffect transition="in" filter="fade">
+                                      <p:cBhvr>
+                                        <p:cTn id="7" dur="500"/>
+                                        <p:tgtEl>
+                                          <p:spTgt spid="6">
+                                            <p:txEl>
+                                              <p:pRg st="1" end="1"/>
+                                            </p:txEl>
+                                          </p:spTgt>
+                                        </p:tgtEl>
+                                      </p:cBhvr>
+                                    </p:animEffect>
+                                  </p:childTnLst>
+                                </p:cTn>
+                              </p:par>
+                            </p:childTnLst>
+                          </p:cTn>
+                        </p:par>
+                      </p:childTnLst>
+                    </p:cTn>
+                  </p:par>
+                </p:childTnLst>
+              </p:cTn>
+              <p:prevCondLst>
+                <p:cond evt="onPrev" delay="0">
+                  <p:tgtEl>
+                    <p:sldTgt/>
+                  </p:tgtEl>
+                </p:cond>
+              </p:prevCondLst>
+              <p:nextCondLst>
+                <p:cond evt="onNext" delay="0">
+                  <p:tgtEl>
+                    <p:sldTgt/>
+                  </p:tgtEl>
+                </p:cond>
+              </p:nextCondLst>
+            </p:seq>
+          </p:childTnLst>
+        </p:cTn>
+      </p:par>
+    </p:tnLst>
+  </p:timing>
+</p:sld>
+</file>
+
+<file path=ppt/slides/slide6.xml><?xml version="1.0" encoding="utf-8"?>
+<p:sld xmlns:a="http://schemas.openxmlformats.org/drawingml/2006/main" xmlns:r="http://schemas.openxmlformats.org/officeDocument/2006/relationships" xmlns:p="http://schemas.openxmlformats.org/presentationml/2006/main">
+  <p:cSld>
+    <p:spTree>
+      <p:nvGrpSpPr>
+        <p:cNvPr id="1" name="">
+          <a:extLst>
+            <a:ext uri="{FF2B5EF4-FFF2-40B4-BE49-F238E27FC236}">
+              <a16:creationId xmlns:a16="http://schemas.microsoft.com/office/drawing/2014/main" id="{AE988348-B53A-3D73-0D57-9E01BB52EAC1}"/>
+            </a:ext>
+          </a:extLst>
+        </p:cNvPr>
+        <p:cNvGrpSpPr/>
+        <p:nvPr/>
+      </p:nvGrpSpPr>
+      <p:grpSpPr>
+        <a:xfrm>
+          <a:off x="0" y="0"/>
+          <a:ext cx="0" cy="0"/>
+          <a:chOff x="0" y="0"/>
+          <a:chExt cx="0" cy="0"/>
+        </a:xfrm>
+      </p:grpSpPr>
+      <p:sp>
+        <p:nvSpPr>
+          <p:cNvPr id="2" name="Zástupný symbol pro zápatí 1">
+            <a:extLst>
+              <a:ext uri="{FF2B5EF4-FFF2-40B4-BE49-F238E27FC236}">
+                <a16:creationId xmlns:a16="http://schemas.microsoft.com/office/drawing/2014/main" id="{A6DB33B7-413A-ECD4-E274-56426B5FC81D}"/>
+              </a:ext>
+            </a:extLst>
+          </p:cNvPr>
+          <p:cNvSpPr>
+            <a:spLocks noGrp="1"/>
+          </p:cNvSpPr>
+          <p:nvPr>
+            <p:ph type="ftr" sz="quarter" idx="10"/>
+          </p:nvPr>
+        </p:nvSpPr>
+        <p:spPr/>
+        <p:txBody>
+          <a:bodyPr/>
+          <a:lstStyle/>
+          <a:p>
+            <a:r>
+              <a:rPr lang="cs-CZ" noProof="0" dirty="0"/>
+              <a:t>PV293 - Softwarové architektury</a:t>
+            </a:r>
+          </a:p>
+        </p:txBody>
+      </p:sp>
+      <p:sp>
+        <p:nvSpPr>
+          <p:cNvPr id="3" name="Zástupný symbol pro číslo snímku 2">
+            <a:extLst>
+              <a:ext uri="{FF2B5EF4-FFF2-40B4-BE49-F238E27FC236}">
+                <a16:creationId xmlns:a16="http://schemas.microsoft.com/office/drawing/2014/main" id="{3DB28EF7-1BD0-AC97-B202-3E0CCB0044E2}"/>
+              </a:ext>
+            </a:extLst>
+          </p:cNvPr>
+          <p:cNvSpPr>
+            <a:spLocks noGrp="1"/>
+          </p:cNvSpPr>
+          <p:nvPr>
+            <p:ph type="sldNum" sz="quarter" idx="11"/>
+          </p:nvPr>
+        </p:nvSpPr>
+        <p:spPr/>
+        <p:txBody>
+          <a:bodyPr/>
+          <a:lstStyle/>
+          <a:p>
+            <a:fld id="{0970407D-EE58-4A0B-824B-1D3AE42DD9CF}" type="slidenum">
+              <a:rPr lang="cs-CZ" noProof="0" smtClean="0"/>
+              <a:pPr/>
+              <a:t>6</a:t>
+            </a:fld>
+            <a:endParaRPr lang="cs-CZ" noProof="0" dirty="0"/>
+          </a:p>
+        </p:txBody>
+      </p:sp>
+      <p:sp>
+        <p:nvSpPr>
+          <p:cNvPr id="4" name="Nadpis 3">
+            <a:extLst>
+              <a:ext uri="{FF2B5EF4-FFF2-40B4-BE49-F238E27FC236}">
+                <a16:creationId xmlns:a16="http://schemas.microsoft.com/office/drawing/2014/main" id="{994C357D-AD64-03F1-5BD7-92574B4F7A02}"/>
+              </a:ext>
+            </a:extLst>
+          </p:cNvPr>
+          <p:cNvSpPr>
+            <a:spLocks noGrp="1"/>
+          </p:cNvSpPr>
+          <p:nvPr>
+            <p:ph type="title"/>
+          </p:nvPr>
+        </p:nvSpPr>
+        <p:spPr/>
+        <p:txBody>
+          <a:bodyPr/>
+          <a:lstStyle/>
+          <a:p>
+            <a:r>
+              <a:rPr lang="cs-CZ" noProof="0" dirty="0" err="1"/>
+              <a:t>MediatR</a:t>
+            </a:r>
+            <a:r>
+              <a:rPr lang="cs-CZ" noProof="0" dirty="0"/>
+              <a:t> - </a:t>
+            </a:r>
+            <a:r>
+              <a:rPr lang="cs-CZ" dirty="0" err="1"/>
+              <a:t>Mediator</a:t>
+            </a:r>
+            <a:r>
+              <a:rPr lang="cs-CZ" dirty="0"/>
+              <a:t> </a:t>
+            </a:r>
+            <a:r>
+              <a:rPr lang="cs-CZ" dirty="0" err="1"/>
+              <a:t>pattern</a:t>
+            </a:r>
+            <a:endParaRPr lang="cs-CZ" noProof="0" dirty="0"/>
+          </a:p>
+        </p:txBody>
+      </p:sp>
+      <p:sp>
+        <p:nvSpPr>
+          <p:cNvPr id="6" name="Zástupný obsah 5">
+            <a:extLst>
+              <a:ext uri="{FF2B5EF4-FFF2-40B4-BE49-F238E27FC236}">
+                <a16:creationId xmlns:a16="http://schemas.microsoft.com/office/drawing/2014/main" id="{BA7B6465-047E-6A0E-5BF9-FAA3BD51D305}"/>
+              </a:ext>
+            </a:extLst>
+          </p:cNvPr>
+          <p:cNvSpPr>
+            <a:spLocks noGrp="1"/>
+          </p:cNvSpPr>
+          <p:nvPr>
+            <p:ph idx="1"/>
+          </p:nvPr>
+        </p:nvSpPr>
+        <p:spPr/>
+        <p:txBody>
+          <a:bodyPr/>
+          <a:lstStyle/>
+          <a:p>
+            <a:r>
+              <a:rPr lang="cs-CZ" dirty="0"/>
+              <a:t>Zlehčuje komunikaci mezi komponenty v .Net aplikací</a:t>
+            </a:r>
+          </a:p>
+          <a:p>
+            <a:pPr lvl="1"/>
+            <a:r>
+              <a:rPr lang="cs-CZ" dirty="0"/>
+              <a:t>Nedochází k přímému propojení mezi </a:t>
+            </a:r>
+            <a:r>
+              <a:rPr lang="cs-CZ" dirty="0" err="1"/>
+              <a:t>controllerem</a:t>
+            </a:r>
+            <a:r>
+              <a:rPr lang="cs-CZ" dirty="0"/>
+              <a:t> (PL) a </a:t>
+            </a:r>
+            <a:r>
+              <a:rPr lang="cs-CZ" dirty="0" err="1"/>
+              <a:t>service</a:t>
+            </a:r>
+            <a:r>
+              <a:rPr lang="cs-CZ" dirty="0"/>
+              <a:t> (BL), ale k volaní </a:t>
+            </a:r>
+            <a:r>
+              <a:rPr lang="cs-CZ" dirty="0" err="1"/>
+              <a:t>requestu</a:t>
+            </a:r>
+            <a:r>
+              <a:rPr lang="cs-CZ" dirty="0"/>
+              <a:t>, který následně zpracuje </a:t>
+            </a:r>
+            <a:r>
+              <a:rPr lang="cs-CZ" dirty="0" err="1"/>
+              <a:t>handler</a:t>
+            </a:r>
+            <a:r>
+              <a:rPr lang="cs-CZ" dirty="0"/>
+              <a:t>, který nám vrátí předem určená data (nejčastěji </a:t>
+            </a:r>
+            <a:r>
+              <a:rPr lang="cs-CZ" dirty="0" err="1"/>
+              <a:t>DTOs</a:t>
+            </a:r>
+            <a:r>
+              <a:rPr lang="cs-CZ" dirty="0"/>
+              <a:t>).</a:t>
+            </a:r>
+          </a:p>
+          <a:p>
+            <a:r>
+              <a:rPr lang="cs-CZ" dirty="0"/>
+              <a:t>Přirozená podpora pro CQRS, </a:t>
+            </a:r>
+            <a:r>
+              <a:rPr lang="cs-CZ" dirty="0" err="1"/>
+              <a:t>Pipeline</a:t>
+            </a:r>
+            <a:r>
+              <a:rPr lang="cs-CZ" dirty="0"/>
+              <a:t> </a:t>
+            </a:r>
+            <a:r>
+              <a:rPr lang="cs-CZ" dirty="0" err="1"/>
+              <a:t>Behavior</a:t>
+            </a:r>
+            <a:r>
+              <a:rPr lang="cs-CZ" dirty="0"/>
+              <a:t>…</a:t>
+            </a:r>
+          </a:p>
+          <a:p>
+            <a:r>
+              <a:rPr lang="cs-CZ" dirty="0"/>
+              <a:t>Co mohu potkat:</a:t>
+            </a:r>
+          </a:p>
+          <a:p>
+            <a:pPr lvl="1"/>
+            <a:r>
+              <a:rPr lang="cs-CZ" dirty="0" err="1"/>
+              <a:t>Request</a:t>
+            </a:r>
+            <a:r>
+              <a:rPr lang="cs-CZ" dirty="0"/>
+              <a:t> – jedná se o </a:t>
+            </a:r>
+            <a:r>
+              <a:rPr lang="cs-CZ" dirty="0" err="1"/>
+              <a:t>command</a:t>
+            </a:r>
+            <a:r>
+              <a:rPr lang="cs-CZ" dirty="0"/>
+              <a:t> nebo </a:t>
+            </a:r>
+            <a:r>
+              <a:rPr lang="cs-CZ" dirty="0" err="1"/>
+              <a:t>query</a:t>
+            </a:r>
+            <a:endParaRPr lang="cs-CZ" dirty="0"/>
+          </a:p>
+          <a:p>
+            <a:pPr lvl="1"/>
+            <a:r>
+              <a:rPr lang="cs-CZ" dirty="0" err="1"/>
+              <a:t>Handler</a:t>
+            </a:r>
+            <a:r>
+              <a:rPr lang="cs-CZ" dirty="0"/>
+              <a:t> – zpracování </a:t>
+            </a:r>
+            <a:r>
+              <a:rPr lang="cs-CZ" dirty="0" err="1"/>
+              <a:t>commandu</a:t>
+            </a:r>
+            <a:r>
+              <a:rPr lang="cs-CZ" dirty="0"/>
+              <a:t> nebo </a:t>
+            </a:r>
+            <a:r>
+              <a:rPr lang="cs-CZ" dirty="0" err="1"/>
+              <a:t>query</a:t>
+            </a:r>
+            <a:r>
+              <a:rPr lang="cs-CZ" dirty="0"/>
+              <a:t> na úrovni BL</a:t>
+            </a:r>
+          </a:p>
+          <a:p>
+            <a:pPr lvl="1"/>
+            <a:r>
+              <a:rPr lang="cs-CZ" dirty="0" err="1"/>
+              <a:t>Notification</a:t>
+            </a:r>
+            <a:r>
+              <a:rPr lang="cs-CZ" dirty="0"/>
+              <a:t> – poslání pomocí </a:t>
+            </a:r>
+            <a:r>
+              <a:rPr lang="cs-CZ" dirty="0" err="1"/>
+              <a:t>broadcastu</a:t>
+            </a:r>
+            <a:r>
+              <a:rPr lang="cs-CZ" dirty="0"/>
+              <a:t> na více </a:t>
+            </a:r>
+            <a:r>
+              <a:rPr lang="cs-CZ" dirty="0" err="1"/>
+              <a:t>handlerů</a:t>
+            </a:r>
+            <a:r>
+              <a:rPr lang="cs-CZ" dirty="0"/>
+              <a:t> = Event</a:t>
+            </a:r>
+          </a:p>
+          <a:p>
+            <a:pPr lvl="1"/>
+            <a:r>
+              <a:rPr lang="cs-CZ" dirty="0" err="1"/>
+              <a:t>Pipeline</a:t>
+            </a:r>
+            <a:r>
+              <a:rPr lang="cs-CZ" dirty="0"/>
+              <a:t> </a:t>
+            </a:r>
+            <a:r>
+              <a:rPr lang="cs-CZ" dirty="0" err="1"/>
+              <a:t>behavior</a:t>
+            </a:r>
+            <a:r>
+              <a:rPr lang="cs-CZ" dirty="0"/>
+              <a:t> – možnost prokládání </a:t>
+            </a:r>
+            <a:r>
+              <a:rPr lang="cs-CZ" dirty="0" err="1"/>
+              <a:t>jednolivých</a:t>
+            </a:r>
+            <a:r>
+              <a:rPr lang="cs-CZ" dirty="0"/>
+              <a:t> </a:t>
+            </a:r>
+            <a:r>
+              <a:rPr lang="cs-CZ" dirty="0" err="1"/>
+              <a:t>requestů</a:t>
+            </a:r>
+            <a:r>
+              <a:rPr lang="cs-CZ" dirty="0"/>
+              <a:t> (</a:t>
+            </a:r>
+            <a:r>
+              <a:rPr lang="cs-CZ" dirty="0" err="1"/>
+              <a:t>logging</a:t>
+            </a:r>
+            <a:r>
+              <a:rPr lang="cs-CZ" dirty="0"/>
+              <a:t>, validace…)</a:t>
+            </a:r>
+          </a:p>
+          <a:p>
+            <a:pPr lvl="1"/>
+            <a:endParaRPr lang="cs-CZ" dirty="0"/>
+          </a:p>
+        </p:txBody>
+      </p:sp>
+    </p:spTree>
+    <p:extLst>
+      <p:ext uri="{BB962C8B-B14F-4D97-AF65-F5344CB8AC3E}">
+        <p14:creationId xmlns:p14="http://schemas.microsoft.com/office/powerpoint/2010/main" val="2270999026"/>
+      </p:ext>
+    </p:extLst>
+  </p:cSld>
+  <p:clrMapOvr>
+    <a:masterClrMapping/>
+  </p:clrMapOvr>
+  <p:timing>
+    <p:tnLst>
+      <p:par>
+        <p:cTn id="1" dur="indefinite" restart="never" nodeType="tmRoot">
+          <p:childTnLst>
+            <p:seq concurrent="1" nextAc="seek">
+              <p:cTn id="2" dur="indefinite" nodeType="mainSeq">
+                <p:childTnLst>
+                  <p:par>
+                    <p:cTn id="3" fill="hold">
+                      <p:stCondLst>
+                        <p:cond delay="indefinite"/>
+                      </p:stCondLst>
+                      <p:childTnLst>
+                        <p:par>
+                          <p:cTn id="4" fill="hold">
+                            <p:stCondLst>
+                              <p:cond delay="0"/>
+                            </p:stCondLst>
+                            <p:childTnLst>
+                              <p:par>
+                                <p:cTn id="5" presetID="10" presetClass="entr" presetSubtype="0" fill="hold" nodeType="clickEffect">
+                                  <p:stCondLst>
+                                    <p:cond delay="0"/>
+                                  </p:stCondLst>
+                                  <p:childTnLst>
+                                    <p:set>
+                                      <p:cBhvr>
+                                        <p:cTn id="6" dur="1" fill="hold">
+                                          <p:stCondLst>
+                                            <p:cond delay="0"/>
+                                          </p:stCondLst>
+                                        </p:cTn>
+                                        <p:tgtEl>
+                                          <p:spTgt spid="6">
+                                            <p:txEl>
+                                              <p:pRg st="1" end="1"/>
+                                            </p:txEl>
+                                          </p:spTgt>
+                                        </p:tgtEl>
+                                        <p:attrNameLst>
+                                          <p:attrName>style.visibility</p:attrName>
+                                        </p:attrNameLst>
+                                      </p:cBhvr>
+                                      <p:to>
+                                        <p:strVal val="visible"/>
+                                      </p:to>
+                                    </p:set>
+                                    <p:animEffect transition="in" filter="fade">
+                                      <p:cBhvr>
+                                        <p:cTn id="7" dur="500"/>
+                                        <p:tgtEl>
+                                          <p:spTgt spid="6">
+                                            <p:txEl>
+                                              <p:pRg st="1" end="1"/>
+                                            </p:txEl>
+                                          </p:spTgt>
+                                        </p:tgtEl>
+                                      </p:cBhvr>
+                                    </p:animEffect>
+                                  </p:childTnLst>
+                                </p:cTn>
+                              </p:par>
+                            </p:childTnLst>
+                          </p:cTn>
+                        </p:par>
+                      </p:childTnLst>
+                    </p:cTn>
+                  </p:par>
+                  <p:par>
+                    <p:cTn id="8" fill="hold">
+                      <p:stCondLst>
+                        <p:cond delay="indefinite"/>
+                      </p:stCondLst>
+                      <p:childTnLst>
+                        <p:par>
+                          <p:cTn id="9" fill="hold">
+                            <p:stCondLst>
+                              <p:cond delay="0"/>
+                            </p:stCondLst>
+                            <p:childTnLst>
+                              <p:par>
+                                <p:cTn id="10" presetID="10" presetClass="entr" presetSubtype="0" fill="hold" nodeType="clickEffect">
+                                  <p:stCondLst>
+                                    <p:cond delay="0"/>
+                                  </p:stCondLst>
+                                  <p:childTnLst>
+                                    <p:set>
+                                      <p:cBhvr>
+                                        <p:cTn id="11" dur="1" fill="hold">
+                                          <p:stCondLst>
+                                            <p:cond delay="0"/>
+                                          </p:stCondLst>
+                                        </p:cTn>
+                                        <p:tgtEl>
+                                          <p:spTgt spid="6">
+                                            <p:txEl>
+                                              <p:pRg st="2" end="2"/>
+                                            </p:txEl>
+                                          </p:spTgt>
+                                        </p:tgtEl>
+                                        <p:attrNameLst>
+                                          <p:attrName>style.visibility</p:attrName>
+                                        </p:attrNameLst>
+                                      </p:cBhvr>
+                                      <p:to>
+                                        <p:strVal val="visible"/>
+                                      </p:to>
+                                    </p:set>
+                                    <p:animEffect transition="in" filter="fade">
+                                      <p:cBhvr>
+                                        <p:cTn id="12" dur="500"/>
+                                        <p:tgtEl>
+                                          <p:spTgt spid="6">
+                                            <p:txEl>
+                                              <p:pRg st="2" end="2"/>
+                                            </p:txEl>
+                                          </p:spTgt>
+                                        </p:tgtEl>
+                                      </p:cBhvr>
+                                    </p:animEffect>
+                                  </p:childTnLst>
+                                </p:cTn>
+                              </p:par>
+                            </p:childTnLst>
+                          </p:cTn>
+                        </p:par>
+                      </p:childTnLst>
+                    </p:cTn>
+                  </p:par>
+                  <p:par>
+                    <p:cTn id="13" fill="hold">
+                      <p:stCondLst>
+                        <p:cond delay="indefinite"/>
+                      </p:stCondLst>
+                      <p:childTnLst>
+                        <p:par>
+                          <p:cTn id="14" fill="hold">
+                            <p:stCondLst>
+                              <p:cond delay="0"/>
+                            </p:stCondLst>
+                            <p:childTnLst>
+                              <p:par>
+                                <p:cTn id="15" presetID="10" presetClass="entr" presetSubtype="0" fill="hold" nodeType="clickEffect">
+                                  <p:stCondLst>
+                                    <p:cond delay="0"/>
+                                  </p:stCondLst>
+                                  <p:childTnLst>
+                                    <p:set>
+                                      <p:cBhvr>
+                                        <p:cTn id="16" dur="1" fill="hold">
+                                          <p:stCondLst>
+                                            <p:cond delay="0"/>
+                                          </p:stCondLst>
+                                        </p:cTn>
+                                        <p:tgtEl>
+                                          <p:spTgt spid="6">
+                                            <p:txEl>
+                                              <p:pRg st="3" end="3"/>
+                                            </p:txEl>
+                                          </p:spTgt>
+                                        </p:tgtEl>
+                                        <p:attrNameLst>
+                                          <p:attrName>style.visibility</p:attrName>
+                                        </p:attrNameLst>
+                                      </p:cBhvr>
+                                      <p:to>
+                                        <p:strVal val="visible"/>
+                                      </p:to>
+                                    </p:set>
+                                    <p:animEffect transition="in" filter="fade">
+                                      <p:cBhvr>
+                                        <p:cTn id="17" dur="500"/>
+                                        <p:tgtEl>
+                                          <p:spTgt spid="6">
+                                            <p:txEl>
+                                              <p:pRg st="3" end="3"/>
+                                            </p:txEl>
+                                          </p:spTgt>
+                                        </p:tgtEl>
+                                      </p:cBhvr>
+                                    </p:animEffect>
+                                  </p:childTnLst>
+                                </p:cTn>
+                              </p:par>
+                              <p:par>
+                                <p:cTn id="18" presetID="10" presetClass="entr" presetSubtype="0" fill="hold" nodeType="withEffect">
+                                  <p:stCondLst>
+                                    <p:cond delay="0"/>
+                                  </p:stCondLst>
+                                  <p:childTnLst>
+                                    <p:set>
+                                      <p:cBhvr>
+                                        <p:cTn id="19" dur="1" fill="hold">
+                                          <p:stCondLst>
+                                            <p:cond delay="0"/>
+                                          </p:stCondLst>
+                                        </p:cTn>
+                                        <p:tgtEl>
+                                          <p:spTgt spid="6">
+                                            <p:txEl>
+                                              <p:pRg st="4" end="4"/>
+                                            </p:txEl>
+                                          </p:spTgt>
+                                        </p:tgtEl>
+                                        <p:attrNameLst>
+                                          <p:attrName>style.visibility</p:attrName>
+                                        </p:attrNameLst>
+                                      </p:cBhvr>
+                                      <p:to>
+                                        <p:strVal val="visible"/>
+                                      </p:to>
+                                    </p:set>
+                                    <p:animEffect transition="in" filter="fade">
+                                      <p:cBhvr>
+                                        <p:cTn id="20" dur="500"/>
+                                        <p:tgtEl>
+                                          <p:spTgt spid="6">
+                                            <p:txEl>
+                                              <p:pRg st="4" end="4"/>
+                                            </p:txEl>
+                                          </p:spTgt>
+                                        </p:tgtEl>
+                                      </p:cBhvr>
+                                    </p:animEffect>
+                                  </p:childTnLst>
+                                </p:cTn>
+                              </p:par>
+                              <p:par>
+                                <p:cTn id="21" presetID="10" presetClass="entr" presetSubtype="0" fill="hold" nodeType="withEffect">
+                                  <p:stCondLst>
+                                    <p:cond delay="0"/>
+                                  </p:stCondLst>
+                                  <p:childTnLst>
+                                    <p:set>
+                                      <p:cBhvr>
+                                        <p:cTn id="22" dur="1" fill="hold">
+                                          <p:stCondLst>
+                                            <p:cond delay="0"/>
+                                          </p:stCondLst>
+                                        </p:cTn>
+                                        <p:tgtEl>
+                                          <p:spTgt spid="6">
+                                            <p:txEl>
+                                              <p:pRg st="5" end="5"/>
+                                            </p:txEl>
+                                          </p:spTgt>
+                                        </p:tgtEl>
+                                        <p:attrNameLst>
+                                          <p:attrName>style.visibility</p:attrName>
+                                        </p:attrNameLst>
+                                      </p:cBhvr>
+                                      <p:to>
+                                        <p:strVal val="visible"/>
+                                      </p:to>
+                                    </p:set>
+                                    <p:animEffect transition="in" filter="fade">
+                                      <p:cBhvr>
+                                        <p:cTn id="23" dur="500"/>
+                                        <p:tgtEl>
+                                          <p:spTgt spid="6">
+                                            <p:txEl>
+                                              <p:pRg st="5" end="5"/>
+                                            </p:txEl>
+                                          </p:spTgt>
+                                        </p:tgtEl>
+                                      </p:cBhvr>
+                                    </p:animEffect>
+                                  </p:childTnLst>
+                                </p:cTn>
+                              </p:par>
+                              <p:par>
+                                <p:cTn id="24" presetID="10" presetClass="entr" presetSubtype="0" fill="hold" nodeType="withEffect">
+                                  <p:stCondLst>
+                                    <p:cond delay="0"/>
+                                  </p:stCondLst>
+                                  <p:childTnLst>
+                                    <p:set>
+                                      <p:cBhvr>
+                                        <p:cTn id="25" dur="1" fill="hold">
+                                          <p:stCondLst>
+                                            <p:cond delay="0"/>
+                                          </p:stCondLst>
+                                        </p:cTn>
+                                        <p:tgtEl>
+                                          <p:spTgt spid="6">
+                                            <p:txEl>
+                                              <p:pRg st="6" end="6"/>
+                                            </p:txEl>
+                                          </p:spTgt>
+                                        </p:tgtEl>
+                                        <p:attrNameLst>
+                                          <p:attrName>style.visibility</p:attrName>
+                                        </p:attrNameLst>
+                                      </p:cBhvr>
+                                      <p:to>
+                                        <p:strVal val="visible"/>
+                                      </p:to>
+                                    </p:set>
+                                    <p:animEffect transition="in" filter="fade">
+                                      <p:cBhvr>
+                                        <p:cTn id="26" dur="500"/>
+                                        <p:tgtEl>
+                                          <p:spTgt spid="6">
+                                            <p:txEl>
+                                              <p:pRg st="6" end="6"/>
+                                            </p:txEl>
+                                          </p:spTgt>
+                                        </p:tgtEl>
+                                      </p:cBhvr>
+                                    </p:animEffect>
+                                  </p:childTnLst>
+                                </p:cTn>
+                              </p:par>
+                              <p:par>
+                                <p:cTn id="27" presetID="10" presetClass="entr" presetSubtype="0" fill="hold" nodeType="withEffect">
+                                  <p:stCondLst>
+                                    <p:cond delay="0"/>
+                                  </p:stCondLst>
+                                  <p:childTnLst>
+                                    <p:set>
+                                      <p:cBhvr>
+                                        <p:cTn id="28" dur="1" fill="hold">
+                                          <p:stCondLst>
+                                            <p:cond delay="0"/>
+                                          </p:stCondLst>
+                                        </p:cTn>
+                                        <p:tgtEl>
+                                          <p:spTgt spid="6">
+                                            <p:txEl>
+                                              <p:pRg st="7" end="7"/>
+                                            </p:txEl>
+                                          </p:spTgt>
+                                        </p:tgtEl>
+                                        <p:attrNameLst>
+                                          <p:attrName>style.visibility</p:attrName>
+                                        </p:attrNameLst>
+                                      </p:cBhvr>
+                                      <p:to>
+                                        <p:strVal val="visible"/>
+                                      </p:to>
+                                    </p:set>
+                                    <p:animEffect transition="in" filter="fade">
+                                      <p:cBhvr>
+                                        <p:cTn id="29" dur="500"/>
+                                        <p:tgtEl>
+                                          <p:spTgt spid="6">
+                                            <p:txEl>
+                                              <p:pRg st="7" end="7"/>
+                                            </p:txEl>
+                                          </p:spTgt>
+                                        </p:tgtEl>
+                                      </p:cBhvr>
+                                    </p:animEffect>
+                                  </p:childTnLst>
+                                </p:cTn>
+                              </p:par>
+                            </p:childTnLst>
+                          </p:cTn>
+                        </p:par>
+                      </p:childTnLst>
+                    </p:cTn>
+                  </p:par>
+                </p:childTnLst>
+              </p:cTn>
+              <p:prevCondLst>
+                <p:cond evt="onPrev" delay="0">
+                  <p:tgtEl>
+                    <p:sldTgt/>
+                  </p:tgtEl>
+                </p:cond>
+              </p:prevCondLst>
+              <p:nextCondLst>
+                <p:cond evt="onNext" delay="0">
+                  <p:tgtEl>
+                    <p:sldTgt/>
+                  </p:tgtEl>
+                </p:cond>
+              </p:nextCondLst>
+            </p:seq>
+          </p:childTnLst>
+        </p:cTn>
+      </p:par>
+    </p:tnLst>
+  </p:timing>
 </p:sld>
 </file>
 

</xml_diff>